<commit_message>
no real update, soon
</commit_message>
<xml_diff>
--- a/Powerpoint/ProjectPresentation_Draft.pptx
+++ b/Powerpoint/ProjectPresentation_Draft.pptx
@@ -221,7 +221,7 @@
           <a:p>
             <a:fld id="{B7C7631C-A9DC-41CB-8361-5DDD15E7CE5C}" type="datetimeFigureOut">
               <a:rPr lang="en-US" smtClean="0"/>
-              <a:t>4/29/2015</a:t>
+              <a:t>4/30/2015</a:t>
             </a:fld>
             <a:endParaRPr lang="en-US"/>
           </a:p>
@@ -545,11 +545,7 @@
             </a:r>
             <a:r>
               <a:rPr lang="en-US" baseline="0" dirty="0" smtClean="0"/>
-              <a:t> </a:t>
-            </a:r>
-            <a:r>
-              <a:rPr lang="en-US" baseline="0" dirty="0" smtClean="0"/>
-              <a:t>and tumor suppression genes especially</a:t>
+              <a:t> and tumor suppression genes especially</a:t>
             </a:r>
             <a:endParaRPr lang="en-US" dirty="0"/>
           </a:p>
@@ -1358,11 +1354,7 @@
           <a:p>
             <a:r>
               <a:rPr lang="en-US" sz="1200" dirty="0" smtClean="0"/>
-              <a:t>Lesson </a:t>
-            </a:r>
-            <a:r>
-              <a:rPr lang="en-US" sz="1200" dirty="0" smtClean="0"/>
-              <a:t>learned: look at you data very carefully!</a:t>
+              <a:t>Lesson learned: look at you data very carefully!</a:t>
             </a:r>
             <a:endParaRPr lang="en-US" dirty="0"/>
           </a:p>
@@ -1799,7 +1791,7 @@
           <a:p>
             <a:fld id="{3725F9EA-79D2-4A85-AF2B-6AD6962FCEAD}" type="datetimeFigureOut">
               <a:rPr lang="en-US" smtClean="0"/>
-              <a:t>4/29/2015</a:t>
+              <a:t>4/30/2015</a:t>
             </a:fld>
             <a:endParaRPr lang="en-US"/>
           </a:p>
@@ -1969,7 +1961,7 @@
           <a:p>
             <a:fld id="{3725F9EA-79D2-4A85-AF2B-6AD6962FCEAD}" type="datetimeFigureOut">
               <a:rPr lang="en-US" smtClean="0"/>
-              <a:t>4/29/2015</a:t>
+              <a:t>4/30/2015</a:t>
             </a:fld>
             <a:endParaRPr lang="en-US"/>
           </a:p>
@@ -2149,7 +2141,7 @@
           <a:p>
             <a:fld id="{3725F9EA-79D2-4A85-AF2B-6AD6962FCEAD}" type="datetimeFigureOut">
               <a:rPr lang="en-US" smtClean="0"/>
-              <a:t>4/29/2015</a:t>
+              <a:t>4/30/2015</a:t>
             </a:fld>
             <a:endParaRPr lang="en-US"/>
           </a:p>
@@ -2319,7 +2311,7 @@
           <a:p>
             <a:fld id="{3725F9EA-79D2-4A85-AF2B-6AD6962FCEAD}" type="datetimeFigureOut">
               <a:rPr lang="en-US" smtClean="0"/>
-              <a:t>4/29/2015</a:t>
+              <a:t>4/30/2015</a:t>
             </a:fld>
             <a:endParaRPr lang="en-US"/>
           </a:p>
@@ -2563,7 +2555,7 @@
           <a:p>
             <a:fld id="{3725F9EA-79D2-4A85-AF2B-6AD6962FCEAD}" type="datetimeFigureOut">
               <a:rPr lang="en-US" smtClean="0"/>
-              <a:t>4/29/2015</a:t>
+              <a:t>4/30/2015</a:t>
             </a:fld>
             <a:endParaRPr lang="en-US"/>
           </a:p>
@@ -2795,7 +2787,7 @@
           <a:p>
             <a:fld id="{3725F9EA-79D2-4A85-AF2B-6AD6962FCEAD}" type="datetimeFigureOut">
               <a:rPr lang="en-US" smtClean="0"/>
-              <a:t>4/29/2015</a:t>
+              <a:t>4/30/2015</a:t>
             </a:fld>
             <a:endParaRPr lang="en-US"/>
           </a:p>
@@ -3162,7 +3154,7 @@
           <a:p>
             <a:fld id="{3725F9EA-79D2-4A85-AF2B-6AD6962FCEAD}" type="datetimeFigureOut">
               <a:rPr lang="en-US" smtClean="0"/>
-              <a:t>4/29/2015</a:t>
+              <a:t>4/30/2015</a:t>
             </a:fld>
             <a:endParaRPr lang="en-US"/>
           </a:p>
@@ -3280,7 +3272,7 @@
           <a:p>
             <a:fld id="{3725F9EA-79D2-4A85-AF2B-6AD6962FCEAD}" type="datetimeFigureOut">
               <a:rPr lang="en-US" smtClean="0"/>
-              <a:t>4/29/2015</a:t>
+              <a:t>4/30/2015</a:t>
             </a:fld>
             <a:endParaRPr lang="en-US"/>
           </a:p>
@@ -3375,7 +3367,7 @@
           <a:p>
             <a:fld id="{3725F9EA-79D2-4A85-AF2B-6AD6962FCEAD}" type="datetimeFigureOut">
               <a:rPr lang="en-US" smtClean="0"/>
-              <a:t>4/29/2015</a:t>
+              <a:t>4/30/2015</a:t>
             </a:fld>
             <a:endParaRPr lang="en-US"/>
           </a:p>
@@ -3652,7 +3644,7 @@
           <a:p>
             <a:fld id="{3725F9EA-79D2-4A85-AF2B-6AD6962FCEAD}" type="datetimeFigureOut">
               <a:rPr lang="en-US" smtClean="0"/>
-              <a:t>4/29/2015</a:t>
+              <a:t>4/30/2015</a:t>
             </a:fld>
             <a:endParaRPr lang="en-US"/>
           </a:p>
@@ -3909,7 +3901,7 @@
           <a:p>
             <a:fld id="{3725F9EA-79D2-4A85-AF2B-6AD6962FCEAD}" type="datetimeFigureOut">
               <a:rPr lang="en-US" smtClean="0"/>
-              <a:t>4/29/2015</a:t>
+              <a:t>4/30/2015</a:t>
             </a:fld>
             <a:endParaRPr lang="en-US"/>
           </a:p>
@@ -4122,7 +4114,7 @@
           <a:p>
             <a:fld id="{3725F9EA-79D2-4A85-AF2B-6AD6962FCEAD}" type="datetimeFigureOut">
               <a:rPr lang="en-US" smtClean="0"/>
-              <a:t>4/29/2015</a:t>
+              <a:t>4/30/2015</a:t>
             </a:fld>
             <a:endParaRPr lang="en-US"/>
           </a:p>
@@ -10739,10 +10731,6 @@
               </a:rPr>
               <a:t>This application can find primary cancer site from biopsy data from metastatic sites </a:t>
             </a:r>
-            <a:endParaRPr lang="en-US" dirty="0" smtClean="0">
-              <a:latin typeface="Arial" panose="020B0604020202020204" pitchFamily="34" charset="0"/>
-              <a:cs typeface="Arial" panose="020B0604020202020204" pitchFamily="34" charset="0"/>
-            </a:endParaRPr>
           </a:p>
           <a:p>
             <a:pPr lvl="1"/>
@@ -11153,7 +11141,7 @@
         <p:spPr>
           <a:xfrm>
             <a:off x="628650" y="365126"/>
-            <a:ext cx="7886700" cy="1325563"/>
+            <a:ext cx="7886700" cy="1463674"/>
           </a:xfrm>
         </p:spPr>
         <p:txBody>
@@ -11167,7 +11155,7 @@
                 <a:latin typeface="Arial" panose="020B0604020202020204" pitchFamily="34" charset="0"/>
                 <a:cs typeface="Arial" panose="020B0604020202020204" pitchFamily="34" charset="0"/>
               </a:rPr>
-              <a:t>Characterizing cancer using gene expression has precedence </a:t>
+              <a:t>Characterizing cancer using gene expression or machine learning has precedence </a:t>
             </a:r>
             <a:endParaRPr lang="en-US" dirty="0">
               <a:latin typeface="Arial" panose="020B0604020202020204" pitchFamily="34" charset="0"/>
@@ -11188,13 +11176,13 @@
         </p:nvSpPr>
         <p:spPr>
           <a:xfrm>
-            <a:off x="628650" y="1854653"/>
-            <a:ext cx="7886700" cy="4351338"/>
+            <a:off x="4937179" y="4223988"/>
+            <a:ext cx="4206821" cy="1293028"/>
           </a:xfrm>
         </p:spPr>
         <p:txBody>
           <a:bodyPr>
-            <a:normAutofit/>
+            <a:normAutofit fontScale="32500" lnSpcReduction="20000"/>
           </a:bodyPr>
           <a:lstStyle/>
           <a:p>
@@ -11242,33 +11230,108 @@
             </a:r>
           </a:p>
           <a:p>
+            <a:pPr lvl="1"/>
+            <a:r>
+              <a:rPr lang="en-US" sz="1600" dirty="0">
+                <a:latin typeface="Arial" panose="020B0604020202020204" pitchFamily="34" charset="0"/>
+                <a:cs typeface="Arial" panose="020B0604020202020204" pitchFamily="34" charset="0"/>
+              </a:rPr>
+              <a:t>Using </a:t>
+            </a:r>
+            <a:r>
+              <a:rPr lang="en-US" sz="1600" dirty="0" err="1">
+                <a:latin typeface="Arial" panose="020B0604020202020204" pitchFamily="34" charset="0"/>
+                <a:cs typeface="Arial" panose="020B0604020202020204" pitchFamily="34" charset="0"/>
+              </a:rPr>
+              <a:t>epigenomics</a:t>
+            </a:r>
+            <a:r>
+              <a:rPr lang="en-US" sz="1600" dirty="0">
+                <a:latin typeface="Arial" panose="020B0604020202020204" pitchFamily="34" charset="0"/>
+                <a:cs typeface="Arial" panose="020B0604020202020204" pitchFamily="34" charset="0"/>
+              </a:rPr>
+              <a:t> data to predict gene expression in lung cancer</a:t>
+            </a:r>
+            <a:r>
+              <a:rPr lang="en-US" sz="1600" dirty="0" smtClean="0">
+                <a:latin typeface="Arial" panose="020B0604020202020204" pitchFamily="34" charset="0"/>
+                <a:cs typeface="Arial" panose="020B0604020202020204" pitchFamily="34" charset="0"/>
+              </a:rPr>
+              <a:t>. (Li </a:t>
+            </a:r>
+            <a:r>
+              <a:rPr lang="en-US" sz="1600" i="1" dirty="0" smtClean="0">
+                <a:latin typeface="Arial" panose="020B0604020202020204" pitchFamily="34" charset="0"/>
+                <a:cs typeface="Arial" panose="020B0604020202020204" pitchFamily="34" charset="0"/>
+              </a:rPr>
+              <a:t>et al.</a:t>
+            </a:r>
+            <a:r>
+              <a:rPr lang="en-US" sz="1600" dirty="0" smtClean="0">
+                <a:latin typeface="Arial" panose="020B0604020202020204" pitchFamily="34" charset="0"/>
+                <a:cs typeface="Arial" panose="020B0604020202020204" pitchFamily="34" charset="0"/>
+              </a:rPr>
+              <a:t> 2015)</a:t>
+            </a:r>
+          </a:p>
+          <a:p>
             <a:r>
               <a:rPr lang="en-US" sz="2000" dirty="0">
                 <a:latin typeface="Arial" panose="020B0604020202020204" pitchFamily="34" charset="0"/>
                 <a:cs typeface="Arial" panose="020B0604020202020204" pitchFamily="34" charset="0"/>
               </a:rPr>
-              <a:t>Using </a:t>
-            </a:r>
-            <a:r>
-              <a:rPr lang="en-US" sz="2000" dirty="0" err="1">
+              <a:t>Using high-throughput transcriptomic data for prognosis: a critical overview and perspectives. </a:t>
+            </a:r>
+            <a:r>
+              <a:rPr lang="en-US" sz="2000" dirty="0" smtClean="0">
                 <a:latin typeface="Arial" panose="020B0604020202020204" pitchFamily="34" charset="0"/>
                 <a:cs typeface="Arial" panose="020B0604020202020204" pitchFamily="34" charset="0"/>
               </a:rPr>
-              <a:t>epigenomics</a:t>
-            </a:r>
+              <a:t>(</a:t>
+            </a:r>
+            <a:r>
+              <a:rPr lang="en-US" sz="2000" dirty="0" err="1" smtClean="0">
+                <a:latin typeface="Arial" panose="020B0604020202020204" pitchFamily="34" charset="0"/>
+                <a:cs typeface="Arial" panose="020B0604020202020204" pitchFamily="34" charset="0"/>
+              </a:rPr>
+              <a:t>Domany</a:t>
+            </a:r>
+            <a:r>
+              <a:rPr lang="en-US" sz="2000" dirty="0" smtClean="0">
+                <a:latin typeface="Arial" panose="020B0604020202020204" pitchFamily="34" charset="0"/>
+                <a:cs typeface="Arial" panose="020B0604020202020204" pitchFamily="34" charset="0"/>
+              </a:rPr>
+              <a:t> 2014)</a:t>
+            </a:r>
+          </a:p>
+          <a:p>
             <a:r>
               <a:rPr lang="en-US" sz="2000" dirty="0">
                 <a:latin typeface="Arial" panose="020B0604020202020204" pitchFamily="34" charset="0"/>
                 <a:cs typeface="Arial" panose="020B0604020202020204" pitchFamily="34" charset="0"/>
               </a:rPr>
-              <a:t> data to predict gene expression in lung cancer</a:t>
+              <a:t>Case-based retrieval framework for gene expression data. </a:t>
             </a:r>
             <a:r>
               <a:rPr lang="en-US" sz="2000" dirty="0" smtClean="0">
                 <a:latin typeface="Arial" panose="020B0604020202020204" pitchFamily="34" charset="0"/>
                 <a:cs typeface="Arial" panose="020B0604020202020204" pitchFamily="34" charset="0"/>
               </a:rPr>
-              <a:t>. (Li </a:t>
+              <a:t>(</a:t>
+            </a:r>
+            <a:r>
+              <a:rPr lang="en-US" sz="2000" dirty="0" err="1" smtClean="0">
+                <a:latin typeface="Arial" panose="020B0604020202020204" pitchFamily="34" charset="0"/>
+                <a:cs typeface="Arial" panose="020B0604020202020204" pitchFamily="34" charset="0"/>
+              </a:rPr>
+              <a:t>Anaissi</a:t>
+            </a:r>
+            <a:r>
+              <a:rPr lang="en-US" sz="2000" dirty="0" smtClean="0">
+                <a:latin typeface="Arial" panose="020B0604020202020204" pitchFamily="34" charset="0"/>
+                <a:cs typeface="Arial" panose="020B0604020202020204" pitchFamily="34" charset="0"/>
+              </a:rPr>
+              <a:t> </a:t>
             </a:r>
             <a:r>
               <a:rPr lang="en-US" sz="2000" i="1" dirty="0" smtClean="0">
@@ -11291,58 +11354,14 @@
                 <a:latin typeface="Arial" panose="020B0604020202020204" pitchFamily="34" charset="0"/>
                 <a:cs typeface="Arial" panose="020B0604020202020204" pitchFamily="34" charset="0"/>
               </a:rPr>
-              <a:t>Using high-throughput transcriptomic data for prognosis: a critical overview and perspectives. </a:t>
+              <a:t>Validation and Reproducibility of a Microarray-Based Gene Expression Test for Tumor Identification in Formalin-Fixed, Paraffin-Embedded </a:t>
             </a:r>
             <a:r>
               <a:rPr lang="en-US" sz="2000" dirty="0" smtClean="0">
                 <a:latin typeface="Arial" panose="020B0604020202020204" pitchFamily="34" charset="0"/>
                 <a:cs typeface="Arial" panose="020B0604020202020204" pitchFamily="34" charset="0"/>
               </a:rPr>
-              <a:t>(</a:t>
-            </a:r>
-            <a:r>
-              <a:rPr lang="en-US" sz="2000" dirty="0" err="1" smtClean="0">
-                <a:latin typeface="Arial" panose="020B0604020202020204" pitchFamily="34" charset="0"/>
-                <a:cs typeface="Arial" panose="020B0604020202020204" pitchFamily="34" charset="0"/>
-              </a:rPr>
-              <a:t>Domany</a:t>
-            </a:r>
-            <a:r>
-              <a:rPr lang="en-US" sz="2000" dirty="0" smtClean="0">
-                <a:latin typeface="Arial" panose="020B0604020202020204" pitchFamily="34" charset="0"/>
-                <a:cs typeface="Arial" panose="020B0604020202020204" pitchFamily="34" charset="0"/>
-              </a:rPr>
-              <a:t> 2014)</a:t>
-            </a:r>
-          </a:p>
-          <a:p>
-            <a:r>
-              <a:rPr lang="en-US" sz="2000" dirty="0">
-                <a:latin typeface="Arial" panose="020B0604020202020204" pitchFamily="34" charset="0"/>
-                <a:cs typeface="Arial" panose="020B0604020202020204" pitchFamily="34" charset="0"/>
-              </a:rPr>
-              <a:t>Case-based retrieval framework for gene expression data. </a:t>
-            </a:r>
-            <a:r>
-              <a:rPr lang="en-US" sz="2000" dirty="0" smtClean="0">
-                <a:latin typeface="Arial" panose="020B0604020202020204" pitchFamily="34" charset="0"/>
-                <a:cs typeface="Arial" panose="020B0604020202020204" pitchFamily="34" charset="0"/>
-              </a:rPr>
-              <a:t>(</a:t>
-            </a:r>
-            <a:r>
-              <a:rPr lang="en-US" sz="2000" dirty="0" err="1" smtClean="0">
-                <a:latin typeface="Arial" panose="020B0604020202020204" pitchFamily="34" charset="0"/>
-                <a:cs typeface="Arial" panose="020B0604020202020204" pitchFamily="34" charset="0"/>
-              </a:rPr>
-              <a:t>Anaissi</a:t>
-            </a:r>
-            <a:r>
-              <a:rPr lang="en-US" sz="2000" dirty="0" smtClean="0">
-                <a:latin typeface="Arial" panose="020B0604020202020204" pitchFamily="34" charset="0"/>
-                <a:cs typeface="Arial" panose="020B0604020202020204" pitchFamily="34" charset="0"/>
-              </a:rPr>
-              <a:t> </a:t>
+              <a:t>Specimens (Pillai </a:t>
             </a:r>
             <a:r>
               <a:rPr lang="en-US" sz="2000" i="1" dirty="0" smtClean="0">
@@ -11356,44 +11375,7 @@
                 <a:latin typeface="Arial" panose="020B0604020202020204" pitchFamily="34" charset="0"/>
                 <a:cs typeface="Arial" panose="020B0604020202020204" pitchFamily="34" charset="0"/>
               </a:rPr>
-              <a:t> 2015)</a:t>
-            </a:r>
-          </a:p>
-          <a:p>
-            <a:r>
-              <a:rPr lang="en-US" sz="2000" dirty="0">
-                <a:latin typeface="Arial" panose="020B0604020202020204" pitchFamily="34" charset="0"/>
-                <a:cs typeface="Arial" panose="020B0604020202020204" pitchFamily="34" charset="0"/>
-              </a:rPr>
-              <a:t>Validation and Reproducibility of a Microarray-Based Gene Expression Test for Tumor Identification in Formalin-Fixed, Paraffin-Embedded </a:t>
-            </a:r>
-            <a:r>
-              <a:rPr lang="en-US" sz="2000" dirty="0" smtClean="0">
-                <a:latin typeface="Arial" panose="020B0604020202020204" pitchFamily="34" charset="0"/>
-                <a:cs typeface="Arial" panose="020B0604020202020204" pitchFamily="34" charset="0"/>
-              </a:rPr>
-              <a:t>Specimens (Pillai </a:t>
-            </a:r>
-            <a:r>
-              <a:rPr lang="en-US" sz="2000" i="1" dirty="0" smtClean="0">
-                <a:latin typeface="Arial" panose="020B0604020202020204" pitchFamily="34" charset="0"/>
-                <a:cs typeface="Arial" panose="020B0604020202020204" pitchFamily="34" charset="0"/>
-              </a:rPr>
-              <a:t>et al.</a:t>
-            </a:r>
-            <a:r>
-              <a:rPr lang="en-US" sz="2000" dirty="0" smtClean="0">
-                <a:latin typeface="Arial" panose="020B0604020202020204" pitchFamily="34" charset="0"/>
-                <a:cs typeface="Arial" panose="020B0604020202020204" pitchFamily="34" charset="0"/>
-              </a:rPr>
-              <a:t> 2011</a:t>
-            </a:r>
-            <a:r>
-              <a:rPr lang="en-US" sz="2000" dirty="0" smtClean="0">
-                <a:latin typeface="Arial" panose="020B0604020202020204" pitchFamily="34" charset="0"/>
-                <a:cs typeface="Arial" panose="020B0604020202020204" pitchFamily="34" charset="0"/>
-              </a:rPr>
-              <a:t>)</a:t>
+              <a:t> 2011)</a:t>
             </a:r>
           </a:p>
           <a:p>
@@ -11422,6 +11404,52 @@
               <a:latin typeface="Arial" panose="020B0604020202020204" pitchFamily="34" charset="0"/>
               <a:cs typeface="Arial" panose="020B0604020202020204" pitchFamily="34" charset="0"/>
             </a:endParaRPr>
+          </a:p>
+        </p:txBody>
+      </p:sp>
+      <p:sp>
+        <p:nvSpPr>
+          <p:cNvPr id="5" name="TextBox 4"/>
+          <p:cNvSpPr txBox="1"/>
+          <p:nvPr/>
+        </p:nvSpPr>
+        <p:spPr>
+          <a:xfrm>
+            <a:off x="889000" y="2044700"/>
+            <a:ext cx="4585422" cy="923330"/>
+          </a:xfrm>
+          <a:prstGeom prst="rect">
+            <a:avLst/>
+          </a:prstGeom>
+          <a:noFill/>
+        </p:spPr>
+        <p:txBody>
+          <a:bodyPr wrap="none" rtlCol="0">
+            <a:spAutoFit/>
+          </a:bodyPr>
+          <a:lstStyle/>
+          <a:p>
+            <a:r>
+              <a:rPr lang="en-US" dirty="0" smtClean="0"/>
+              <a:t>Characterizing cancer</a:t>
+            </a:r>
+          </a:p>
+          <a:p>
+            <a:r>
+              <a:rPr lang="en-US" dirty="0" smtClean="0"/>
+              <a:t>BM, SVM, graph based, ANN</a:t>
+            </a:r>
+          </a:p>
+          <a:p>
+            <a:r>
+              <a:rPr lang="en-US" dirty="0" smtClean="0"/>
+              <a:t>Imaging SNP demographic </a:t>
+            </a:r>
+            <a:r>
+              <a:rPr lang="en-US" smtClean="0"/>
+              <a:t>clinical pathological </a:t>
+            </a:r>
+            <a:endParaRPr lang="en-US" dirty="0"/>
           </a:p>
         </p:txBody>
       </p:sp>
@@ -11526,14 +11554,7 @@
                 <a:latin typeface="Arial" panose="020B0604020202020204" pitchFamily="34" charset="0"/>
                 <a:cs typeface="Arial" panose="020B0604020202020204" pitchFamily="34" charset="0"/>
               </a:rPr>
-              <a:t>Primary site cancer </a:t>
-            </a:r>
-            <a:r>
-              <a:rPr lang="en-US" dirty="0" smtClean="0">
-                <a:latin typeface="Arial" panose="020B0604020202020204" pitchFamily="34" charset="0"/>
-                <a:cs typeface="Arial" panose="020B0604020202020204" pitchFamily="34" charset="0"/>
-              </a:rPr>
-              <a:t>type can be determined from gene expression information taken from metastatic site biopsy tissue. </a:t>
+              <a:t>Primary site cancer type can be determined from gene expression information taken from metastatic site biopsy tissue. </a:t>
             </a:r>
             <a:endParaRPr lang="en-US" dirty="0">
               <a:latin typeface="Arial" panose="020B0604020202020204" pitchFamily="34" charset="0"/>
@@ -12851,40 +12872,19 @@
                 <a:latin typeface="Arial" panose="020B0604020202020204" pitchFamily="34" charset="0"/>
                 <a:cs typeface="Arial" panose="020B0604020202020204" pitchFamily="34" charset="0"/>
               </a:rPr>
-              <a:t>52.7 </a:t>
-            </a:r>
+              <a:t>52.7 GB compressed</a:t>
+            </a:r>
+          </a:p>
+          <a:p>
+            <a:pPr marL="0" indent="0">
+              <a:buNone/>
+            </a:pPr>
             <a:r>
               <a:rPr lang="en-US" dirty="0" smtClean="0">
                 <a:latin typeface="Arial" panose="020B0604020202020204" pitchFamily="34" charset="0"/>
                 <a:cs typeface="Arial" panose="020B0604020202020204" pitchFamily="34" charset="0"/>
               </a:rPr>
-              <a:t>GB compressed</a:t>
-            </a:r>
-          </a:p>
-          <a:p>
-            <a:pPr marL="0" indent="0">
-              <a:buNone/>
-            </a:pPr>
-            <a:r>
-              <a:rPr lang="en-US" dirty="0" smtClean="0">
-                <a:latin typeface="Arial" panose="020B0604020202020204" pitchFamily="34" charset="0"/>
-                <a:cs typeface="Arial" panose="020B0604020202020204" pitchFamily="34" charset="0"/>
-              </a:rPr>
-              <a:t>61.0</a:t>
-            </a:r>
-            <a:r>
-              <a:rPr lang="en-US" dirty="0" smtClean="0">
-                <a:latin typeface="Arial" panose="020B0604020202020204" pitchFamily="34" charset="0"/>
-                <a:cs typeface="Arial" panose="020B0604020202020204" pitchFamily="34" charset="0"/>
-              </a:rPr>
-              <a:t> </a:t>
-            </a:r>
-            <a:r>
-              <a:rPr lang="en-US" dirty="0" smtClean="0">
-                <a:latin typeface="Arial" panose="020B0604020202020204" pitchFamily="34" charset="0"/>
-                <a:cs typeface="Arial" panose="020B0604020202020204" pitchFamily="34" charset="0"/>
-              </a:rPr>
-              <a:t>GB uncompressed</a:t>
+              <a:t>61.0 GB uncompressed</a:t>
             </a:r>
             <a:endParaRPr lang="en-US" dirty="0">
               <a:latin typeface="Arial" panose="020B0604020202020204" pitchFamily="34" charset="0"/>
@@ -13130,14 +13130,7 @@
                 <a:latin typeface="Arial" panose="020B0604020202020204" pitchFamily="34" charset="0"/>
                 <a:cs typeface="Arial" panose="020B0604020202020204" pitchFamily="34" charset="0"/>
               </a:rPr>
-              <a:t>#Serializes to .JSON </a:t>
-            </a:r>
-            <a:r>
-              <a:rPr lang="en-US" sz="1800" dirty="0" smtClean="0">
-                <a:latin typeface="Arial" panose="020B0604020202020204" pitchFamily="34" charset="0"/>
-                <a:cs typeface="Arial" panose="020B0604020202020204" pitchFamily="34" charset="0"/>
-              </a:rPr>
-              <a:t>file</a:t>
+              <a:t>#Serializes to .JSON file</a:t>
             </a:r>
             <a:endParaRPr lang="en-US" sz="1800" dirty="0">
               <a:latin typeface="Arial" panose="020B0604020202020204" pitchFamily="34" charset="0"/>
@@ -14389,14 +14382,7 @@
                 <a:latin typeface="Arial" panose="020B0604020202020204" pitchFamily="34" charset="0"/>
                 <a:cs typeface="Arial" panose="020B0604020202020204" pitchFamily="34" charset="0"/>
               </a:rPr>
-              <a:t>. </a:t>
-            </a:r>
-            <a:r>
-              <a:rPr lang="en-US" sz="2400" dirty="0" smtClean="0">
-                <a:latin typeface="Arial" panose="020B0604020202020204" pitchFamily="34" charset="0"/>
-                <a:cs typeface="Arial" panose="020B0604020202020204" pitchFamily="34" charset="0"/>
-              </a:rPr>
-              <a:t>Large data                                                      sets/files </a:t>
+              <a:t>. Large data                                                      sets/files </a:t>
             </a:r>
             <a:endParaRPr lang="en-US" sz="2400" dirty="0">
               <a:latin typeface="Arial" panose="020B0604020202020204" pitchFamily="34" charset="0"/>
@@ -14439,14 +14425,7 @@
                 <a:latin typeface="Arial" panose="020B0604020202020204" pitchFamily="34" charset="0"/>
                 <a:cs typeface="Arial" panose="020B0604020202020204" pitchFamily="34" charset="0"/>
               </a:rPr>
-              <a:t>. </a:t>
-            </a:r>
-            <a:r>
-              <a:rPr lang="en-US" sz="2400" dirty="0" smtClean="0">
-                <a:latin typeface="Arial" panose="020B0604020202020204" pitchFamily="34" charset="0"/>
-                <a:cs typeface="Arial" panose="020B0604020202020204" pitchFamily="34" charset="0"/>
-              </a:rPr>
-              <a:t>Cleared storage space and created test files </a:t>
+              <a:t>. Cleared storage space and created test files </a:t>
             </a:r>
             <a:endParaRPr lang="en-US" sz="2400" dirty="0">
               <a:latin typeface="Arial" panose="020B0604020202020204" pitchFamily="34" charset="0"/>
@@ -14566,14 +14545,7 @@
                 <a:latin typeface="Arial" panose="020B0604020202020204" pitchFamily="34" charset="0"/>
                 <a:cs typeface="Arial" panose="020B0604020202020204" pitchFamily="34" charset="0"/>
               </a:rPr>
-              <a:t>. </a:t>
-            </a:r>
-            <a:r>
-              <a:rPr lang="en-US" sz="2400" dirty="0" smtClean="0">
-                <a:latin typeface="Arial" panose="020B0604020202020204" pitchFamily="34" charset="0"/>
-                <a:cs typeface="Arial" panose="020B0604020202020204" pitchFamily="34" charset="0"/>
-              </a:rPr>
-              <a:t>Microarray vs </a:t>
+              <a:t>. Microarray vs </a:t>
             </a:r>
             <a:r>
               <a:rPr lang="en-US" sz="2400" dirty="0" err="1" smtClean="0">
@@ -14623,14 +14595,7 @@
                 <a:latin typeface="Arial" panose="020B0604020202020204" pitchFamily="34" charset="0"/>
                 <a:cs typeface="Arial" panose="020B0604020202020204" pitchFamily="34" charset="0"/>
               </a:rPr>
-              <a:t>. </a:t>
-            </a:r>
-            <a:r>
-              <a:rPr lang="en-US" sz="2400" dirty="0" smtClean="0">
-                <a:latin typeface="Arial" panose="020B0604020202020204" pitchFamily="34" charset="0"/>
-                <a:cs typeface="Arial" panose="020B0604020202020204" pitchFamily="34" charset="0"/>
-              </a:rPr>
-              <a:t>Gene model counter program</a:t>
+              <a:t>. Gene model counter program</a:t>
             </a:r>
           </a:p>
           <a:p>

</xml_diff>

<commit_message>
Revert "no real update, soon"
This reverts commit 3a3b9ff6c6621eda84299ef823b5ba7d2d360046.
</commit_message>
<xml_diff>
--- a/Powerpoint/ProjectPresentation_Draft.pptx
+++ b/Powerpoint/ProjectPresentation_Draft.pptx
@@ -221,7 +221,7 @@
           <a:p>
             <a:fld id="{B7C7631C-A9DC-41CB-8361-5DDD15E7CE5C}" type="datetimeFigureOut">
               <a:rPr lang="en-US" smtClean="0"/>
-              <a:t>4/30/2015</a:t>
+              <a:t>4/29/2015</a:t>
             </a:fld>
             <a:endParaRPr lang="en-US"/>
           </a:p>
@@ -545,7 +545,11 @@
             </a:r>
             <a:r>
               <a:rPr lang="en-US" baseline="0" dirty="0" smtClean="0"/>
-              <a:t> and tumor suppression genes especially</a:t>
+              <a:t> </a:t>
+            </a:r>
+            <a:r>
+              <a:rPr lang="en-US" baseline="0" dirty="0" smtClean="0"/>
+              <a:t>and tumor suppression genes especially</a:t>
             </a:r>
             <a:endParaRPr lang="en-US" dirty="0"/>
           </a:p>
@@ -1354,7 +1358,11 @@
           <a:p>
             <a:r>
               <a:rPr lang="en-US" sz="1200" dirty="0" smtClean="0"/>
-              <a:t>Lesson learned: look at you data very carefully!</a:t>
+              <a:t>Lesson </a:t>
+            </a:r>
+            <a:r>
+              <a:rPr lang="en-US" sz="1200" dirty="0" smtClean="0"/>
+              <a:t>learned: look at you data very carefully!</a:t>
             </a:r>
             <a:endParaRPr lang="en-US" dirty="0"/>
           </a:p>
@@ -1791,7 +1799,7 @@
           <a:p>
             <a:fld id="{3725F9EA-79D2-4A85-AF2B-6AD6962FCEAD}" type="datetimeFigureOut">
               <a:rPr lang="en-US" smtClean="0"/>
-              <a:t>4/30/2015</a:t>
+              <a:t>4/29/2015</a:t>
             </a:fld>
             <a:endParaRPr lang="en-US"/>
           </a:p>
@@ -1961,7 +1969,7 @@
           <a:p>
             <a:fld id="{3725F9EA-79D2-4A85-AF2B-6AD6962FCEAD}" type="datetimeFigureOut">
               <a:rPr lang="en-US" smtClean="0"/>
-              <a:t>4/30/2015</a:t>
+              <a:t>4/29/2015</a:t>
             </a:fld>
             <a:endParaRPr lang="en-US"/>
           </a:p>
@@ -2141,7 +2149,7 @@
           <a:p>
             <a:fld id="{3725F9EA-79D2-4A85-AF2B-6AD6962FCEAD}" type="datetimeFigureOut">
               <a:rPr lang="en-US" smtClean="0"/>
-              <a:t>4/30/2015</a:t>
+              <a:t>4/29/2015</a:t>
             </a:fld>
             <a:endParaRPr lang="en-US"/>
           </a:p>
@@ -2311,7 +2319,7 @@
           <a:p>
             <a:fld id="{3725F9EA-79D2-4A85-AF2B-6AD6962FCEAD}" type="datetimeFigureOut">
               <a:rPr lang="en-US" smtClean="0"/>
-              <a:t>4/30/2015</a:t>
+              <a:t>4/29/2015</a:t>
             </a:fld>
             <a:endParaRPr lang="en-US"/>
           </a:p>
@@ -2555,7 +2563,7 @@
           <a:p>
             <a:fld id="{3725F9EA-79D2-4A85-AF2B-6AD6962FCEAD}" type="datetimeFigureOut">
               <a:rPr lang="en-US" smtClean="0"/>
-              <a:t>4/30/2015</a:t>
+              <a:t>4/29/2015</a:t>
             </a:fld>
             <a:endParaRPr lang="en-US"/>
           </a:p>
@@ -2787,7 +2795,7 @@
           <a:p>
             <a:fld id="{3725F9EA-79D2-4A85-AF2B-6AD6962FCEAD}" type="datetimeFigureOut">
               <a:rPr lang="en-US" smtClean="0"/>
-              <a:t>4/30/2015</a:t>
+              <a:t>4/29/2015</a:t>
             </a:fld>
             <a:endParaRPr lang="en-US"/>
           </a:p>
@@ -3154,7 +3162,7 @@
           <a:p>
             <a:fld id="{3725F9EA-79D2-4A85-AF2B-6AD6962FCEAD}" type="datetimeFigureOut">
               <a:rPr lang="en-US" smtClean="0"/>
-              <a:t>4/30/2015</a:t>
+              <a:t>4/29/2015</a:t>
             </a:fld>
             <a:endParaRPr lang="en-US"/>
           </a:p>
@@ -3272,7 +3280,7 @@
           <a:p>
             <a:fld id="{3725F9EA-79D2-4A85-AF2B-6AD6962FCEAD}" type="datetimeFigureOut">
               <a:rPr lang="en-US" smtClean="0"/>
-              <a:t>4/30/2015</a:t>
+              <a:t>4/29/2015</a:t>
             </a:fld>
             <a:endParaRPr lang="en-US"/>
           </a:p>
@@ -3367,7 +3375,7 @@
           <a:p>
             <a:fld id="{3725F9EA-79D2-4A85-AF2B-6AD6962FCEAD}" type="datetimeFigureOut">
               <a:rPr lang="en-US" smtClean="0"/>
-              <a:t>4/30/2015</a:t>
+              <a:t>4/29/2015</a:t>
             </a:fld>
             <a:endParaRPr lang="en-US"/>
           </a:p>
@@ -3644,7 +3652,7 @@
           <a:p>
             <a:fld id="{3725F9EA-79D2-4A85-AF2B-6AD6962FCEAD}" type="datetimeFigureOut">
               <a:rPr lang="en-US" smtClean="0"/>
-              <a:t>4/30/2015</a:t>
+              <a:t>4/29/2015</a:t>
             </a:fld>
             <a:endParaRPr lang="en-US"/>
           </a:p>
@@ -3901,7 +3909,7 @@
           <a:p>
             <a:fld id="{3725F9EA-79D2-4A85-AF2B-6AD6962FCEAD}" type="datetimeFigureOut">
               <a:rPr lang="en-US" smtClean="0"/>
-              <a:t>4/30/2015</a:t>
+              <a:t>4/29/2015</a:t>
             </a:fld>
             <a:endParaRPr lang="en-US"/>
           </a:p>
@@ -4114,7 +4122,7 @@
           <a:p>
             <a:fld id="{3725F9EA-79D2-4A85-AF2B-6AD6962FCEAD}" type="datetimeFigureOut">
               <a:rPr lang="en-US" smtClean="0"/>
-              <a:t>4/30/2015</a:t>
+              <a:t>4/29/2015</a:t>
             </a:fld>
             <a:endParaRPr lang="en-US"/>
           </a:p>
@@ -10731,6 +10739,10 @@
               </a:rPr>
               <a:t>This application can find primary cancer site from biopsy data from metastatic sites </a:t>
             </a:r>
+            <a:endParaRPr lang="en-US" dirty="0" smtClean="0">
+              <a:latin typeface="Arial" panose="020B0604020202020204" pitchFamily="34" charset="0"/>
+              <a:cs typeface="Arial" panose="020B0604020202020204" pitchFamily="34" charset="0"/>
+            </a:endParaRPr>
           </a:p>
           <a:p>
             <a:pPr lvl="1"/>
@@ -11141,7 +11153,7 @@
         <p:spPr>
           <a:xfrm>
             <a:off x="628650" y="365126"/>
-            <a:ext cx="7886700" cy="1463674"/>
+            <a:ext cx="7886700" cy="1325563"/>
           </a:xfrm>
         </p:spPr>
         <p:txBody>
@@ -11155,7 +11167,7 @@
                 <a:latin typeface="Arial" panose="020B0604020202020204" pitchFamily="34" charset="0"/>
                 <a:cs typeface="Arial" panose="020B0604020202020204" pitchFamily="34" charset="0"/>
               </a:rPr>
-              <a:t>Characterizing cancer using gene expression or machine learning has precedence </a:t>
+              <a:t>Characterizing cancer using gene expression has precedence </a:t>
             </a:r>
             <a:endParaRPr lang="en-US" dirty="0">
               <a:latin typeface="Arial" panose="020B0604020202020204" pitchFamily="34" charset="0"/>
@@ -11176,13 +11188,13 @@
         </p:nvSpPr>
         <p:spPr>
           <a:xfrm>
-            <a:off x="4937179" y="4223988"/>
-            <a:ext cx="4206821" cy="1293028"/>
+            <a:off x="628650" y="1854653"/>
+            <a:ext cx="7886700" cy="4351338"/>
           </a:xfrm>
         </p:spPr>
         <p:txBody>
           <a:bodyPr>
-            <a:normAutofit fontScale="32500" lnSpcReduction="20000"/>
+            <a:normAutofit/>
           </a:bodyPr>
           <a:lstStyle/>
           <a:p>
@@ -11230,44 +11242,43 @@
             </a:r>
           </a:p>
           <a:p>
-            <a:pPr lvl="1"/>
-            <a:r>
-              <a:rPr lang="en-US" sz="1600" dirty="0">
+            <a:r>
+              <a:rPr lang="en-US" sz="2000" dirty="0">
                 <a:latin typeface="Arial" panose="020B0604020202020204" pitchFamily="34" charset="0"/>
                 <a:cs typeface="Arial" panose="020B0604020202020204" pitchFamily="34" charset="0"/>
               </a:rPr>
               <a:t>Using </a:t>
             </a:r>
             <a:r>
-              <a:rPr lang="en-US" sz="1600" dirty="0" err="1">
+              <a:rPr lang="en-US" sz="2000" dirty="0" err="1">
                 <a:latin typeface="Arial" panose="020B0604020202020204" pitchFamily="34" charset="0"/>
                 <a:cs typeface="Arial" panose="020B0604020202020204" pitchFamily="34" charset="0"/>
               </a:rPr>
               <a:t>epigenomics</a:t>
             </a:r>
             <a:r>
-              <a:rPr lang="en-US" sz="1600" dirty="0">
+              <a:rPr lang="en-US" sz="2000" dirty="0">
                 <a:latin typeface="Arial" panose="020B0604020202020204" pitchFamily="34" charset="0"/>
                 <a:cs typeface="Arial" panose="020B0604020202020204" pitchFamily="34" charset="0"/>
               </a:rPr>
               <a:t> data to predict gene expression in lung cancer</a:t>
             </a:r>
             <a:r>
-              <a:rPr lang="en-US" sz="1600" dirty="0" smtClean="0">
+              <a:rPr lang="en-US" sz="2000" dirty="0" smtClean="0">
                 <a:latin typeface="Arial" panose="020B0604020202020204" pitchFamily="34" charset="0"/>
                 <a:cs typeface="Arial" panose="020B0604020202020204" pitchFamily="34" charset="0"/>
               </a:rPr>
               <a:t>. (Li </a:t>
             </a:r>
             <a:r>
-              <a:rPr lang="en-US" sz="1600" i="1" dirty="0" smtClean="0">
+              <a:rPr lang="en-US" sz="2000" i="1" dirty="0" smtClean="0">
                 <a:latin typeface="Arial" panose="020B0604020202020204" pitchFamily="34" charset="0"/>
                 <a:cs typeface="Arial" panose="020B0604020202020204" pitchFamily="34" charset="0"/>
               </a:rPr>
               <a:t>et al.</a:t>
             </a:r>
             <a:r>
-              <a:rPr lang="en-US" sz="1600" dirty="0" smtClean="0">
+              <a:rPr lang="en-US" sz="2000" dirty="0" smtClean="0">
                 <a:latin typeface="Arial" panose="020B0604020202020204" pitchFamily="34" charset="0"/>
                 <a:cs typeface="Arial" panose="020B0604020202020204" pitchFamily="34" charset="0"/>
               </a:rPr>
@@ -11375,7 +11386,14 @@
                 <a:latin typeface="Arial" panose="020B0604020202020204" pitchFamily="34" charset="0"/>
                 <a:cs typeface="Arial" panose="020B0604020202020204" pitchFamily="34" charset="0"/>
               </a:rPr>
-              <a:t> 2011)</a:t>
+              <a:t> 2011</a:t>
+            </a:r>
+            <a:r>
+              <a:rPr lang="en-US" sz="2000" dirty="0" smtClean="0">
+                <a:latin typeface="Arial" panose="020B0604020202020204" pitchFamily="34" charset="0"/>
+                <a:cs typeface="Arial" panose="020B0604020202020204" pitchFamily="34" charset="0"/>
+              </a:rPr>
+              <a:t>)</a:t>
             </a:r>
           </a:p>
           <a:p>
@@ -11404,52 +11422,6 @@
               <a:latin typeface="Arial" panose="020B0604020202020204" pitchFamily="34" charset="0"/>
               <a:cs typeface="Arial" panose="020B0604020202020204" pitchFamily="34" charset="0"/>
             </a:endParaRPr>
-          </a:p>
-        </p:txBody>
-      </p:sp>
-      <p:sp>
-        <p:nvSpPr>
-          <p:cNvPr id="5" name="TextBox 4"/>
-          <p:cNvSpPr txBox="1"/>
-          <p:nvPr/>
-        </p:nvSpPr>
-        <p:spPr>
-          <a:xfrm>
-            <a:off x="889000" y="2044700"/>
-            <a:ext cx="4585422" cy="923330"/>
-          </a:xfrm>
-          <a:prstGeom prst="rect">
-            <a:avLst/>
-          </a:prstGeom>
-          <a:noFill/>
-        </p:spPr>
-        <p:txBody>
-          <a:bodyPr wrap="none" rtlCol="0">
-            <a:spAutoFit/>
-          </a:bodyPr>
-          <a:lstStyle/>
-          <a:p>
-            <a:r>
-              <a:rPr lang="en-US" dirty="0" smtClean="0"/>
-              <a:t>Characterizing cancer</a:t>
-            </a:r>
-          </a:p>
-          <a:p>
-            <a:r>
-              <a:rPr lang="en-US" dirty="0" smtClean="0"/>
-              <a:t>BM, SVM, graph based, ANN</a:t>
-            </a:r>
-          </a:p>
-          <a:p>
-            <a:r>
-              <a:rPr lang="en-US" dirty="0" smtClean="0"/>
-              <a:t>Imaging SNP demographic </a:t>
-            </a:r>
-            <a:r>
-              <a:rPr lang="en-US" smtClean="0"/>
-              <a:t>clinical pathological </a:t>
-            </a:r>
-            <a:endParaRPr lang="en-US" dirty="0"/>
           </a:p>
         </p:txBody>
       </p:sp>
@@ -11554,7 +11526,14 @@
                 <a:latin typeface="Arial" panose="020B0604020202020204" pitchFamily="34" charset="0"/>
                 <a:cs typeface="Arial" panose="020B0604020202020204" pitchFamily="34" charset="0"/>
               </a:rPr>
-              <a:t>Primary site cancer type can be determined from gene expression information taken from metastatic site biopsy tissue. </a:t>
+              <a:t>Primary site cancer </a:t>
+            </a:r>
+            <a:r>
+              <a:rPr lang="en-US" dirty="0" smtClean="0">
+                <a:latin typeface="Arial" panose="020B0604020202020204" pitchFamily="34" charset="0"/>
+                <a:cs typeface="Arial" panose="020B0604020202020204" pitchFamily="34" charset="0"/>
+              </a:rPr>
+              <a:t>type can be determined from gene expression information taken from metastatic site biopsy tissue. </a:t>
             </a:r>
             <a:endParaRPr lang="en-US" dirty="0">
               <a:latin typeface="Arial" panose="020B0604020202020204" pitchFamily="34" charset="0"/>
@@ -12872,7 +12851,14 @@
                 <a:latin typeface="Arial" panose="020B0604020202020204" pitchFamily="34" charset="0"/>
                 <a:cs typeface="Arial" panose="020B0604020202020204" pitchFamily="34" charset="0"/>
               </a:rPr>
-              <a:t>52.7 GB compressed</a:t>
+              <a:t>52.7 </a:t>
+            </a:r>
+            <a:r>
+              <a:rPr lang="en-US" dirty="0" smtClean="0">
+                <a:latin typeface="Arial" panose="020B0604020202020204" pitchFamily="34" charset="0"/>
+                <a:cs typeface="Arial" panose="020B0604020202020204" pitchFamily="34" charset="0"/>
+              </a:rPr>
+              <a:t>GB compressed</a:t>
             </a:r>
           </a:p>
           <a:p>
@@ -12884,7 +12870,21 @@
                 <a:latin typeface="Arial" panose="020B0604020202020204" pitchFamily="34" charset="0"/>
                 <a:cs typeface="Arial" panose="020B0604020202020204" pitchFamily="34" charset="0"/>
               </a:rPr>
-              <a:t>61.0 GB uncompressed</a:t>
+              <a:t>61.0</a:t>
+            </a:r>
+            <a:r>
+              <a:rPr lang="en-US" dirty="0" smtClean="0">
+                <a:latin typeface="Arial" panose="020B0604020202020204" pitchFamily="34" charset="0"/>
+                <a:cs typeface="Arial" panose="020B0604020202020204" pitchFamily="34" charset="0"/>
+              </a:rPr>
+              <a:t> </a:t>
+            </a:r>
+            <a:r>
+              <a:rPr lang="en-US" dirty="0" smtClean="0">
+                <a:latin typeface="Arial" panose="020B0604020202020204" pitchFamily="34" charset="0"/>
+                <a:cs typeface="Arial" panose="020B0604020202020204" pitchFamily="34" charset="0"/>
+              </a:rPr>
+              <a:t>GB uncompressed</a:t>
             </a:r>
             <a:endParaRPr lang="en-US" dirty="0">
               <a:latin typeface="Arial" panose="020B0604020202020204" pitchFamily="34" charset="0"/>
@@ -13130,7 +13130,14 @@
                 <a:latin typeface="Arial" panose="020B0604020202020204" pitchFamily="34" charset="0"/>
                 <a:cs typeface="Arial" panose="020B0604020202020204" pitchFamily="34" charset="0"/>
               </a:rPr>
-              <a:t>#Serializes to .JSON file</a:t>
+              <a:t>#Serializes to .JSON </a:t>
+            </a:r>
+            <a:r>
+              <a:rPr lang="en-US" sz="1800" dirty="0" smtClean="0">
+                <a:latin typeface="Arial" panose="020B0604020202020204" pitchFamily="34" charset="0"/>
+                <a:cs typeface="Arial" panose="020B0604020202020204" pitchFamily="34" charset="0"/>
+              </a:rPr>
+              <a:t>file</a:t>
             </a:r>
             <a:endParaRPr lang="en-US" sz="1800" dirty="0">
               <a:latin typeface="Arial" panose="020B0604020202020204" pitchFamily="34" charset="0"/>
@@ -14382,7 +14389,14 @@
                 <a:latin typeface="Arial" panose="020B0604020202020204" pitchFamily="34" charset="0"/>
                 <a:cs typeface="Arial" panose="020B0604020202020204" pitchFamily="34" charset="0"/>
               </a:rPr>
-              <a:t>. Large data                                                      sets/files </a:t>
+              <a:t>. </a:t>
+            </a:r>
+            <a:r>
+              <a:rPr lang="en-US" sz="2400" dirty="0" smtClean="0">
+                <a:latin typeface="Arial" panose="020B0604020202020204" pitchFamily="34" charset="0"/>
+                <a:cs typeface="Arial" panose="020B0604020202020204" pitchFamily="34" charset="0"/>
+              </a:rPr>
+              <a:t>Large data                                                      sets/files </a:t>
             </a:r>
             <a:endParaRPr lang="en-US" sz="2400" dirty="0">
               <a:latin typeface="Arial" panose="020B0604020202020204" pitchFamily="34" charset="0"/>
@@ -14425,7 +14439,14 @@
                 <a:latin typeface="Arial" panose="020B0604020202020204" pitchFamily="34" charset="0"/>
                 <a:cs typeface="Arial" panose="020B0604020202020204" pitchFamily="34" charset="0"/>
               </a:rPr>
-              <a:t>. Cleared storage space and created test files </a:t>
+              <a:t>. </a:t>
+            </a:r>
+            <a:r>
+              <a:rPr lang="en-US" sz="2400" dirty="0" smtClean="0">
+                <a:latin typeface="Arial" panose="020B0604020202020204" pitchFamily="34" charset="0"/>
+                <a:cs typeface="Arial" panose="020B0604020202020204" pitchFamily="34" charset="0"/>
+              </a:rPr>
+              <a:t>Cleared storage space and created test files </a:t>
             </a:r>
             <a:endParaRPr lang="en-US" sz="2400" dirty="0">
               <a:latin typeface="Arial" panose="020B0604020202020204" pitchFamily="34" charset="0"/>
@@ -14545,7 +14566,14 @@
                 <a:latin typeface="Arial" panose="020B0604020202020204" pitchFamily="34" charset="0"/>
                 <a:cs typeface="Arial" panose="020B0604020202020204" pitchFamily="34" charset="0"/>
               </a:rPr>
-              <a:t>. Microarray vs </a:t>
+              <a:t>. </a:t>
+            </a:r>
+            <a:r>
+              <a:rPr lang="en-US" sz="2400" dirty="0" smtClean="0">
+                <a:latin typeface="Arial" panose="020B0604020202020204" pitchFamily="34" charset="0"/>
+                <a:cs typeface="Arial" panose="020B0604020202020204" pitchFamily="34" charset="0"/>
+              </a:rPr>
+              <a:t>Microarray vs </a:t>
             </a:r>
             <a:r>
               <a:rPr lang="en-US" sz="2400" dirty="0" err="1" smtClean="0">
@@ -14595,7 +14623,14 @@
                 <a:latin typeface="Arial" panose="020B0604020202020204" pitchFamily="34" charset="0"/>
                 <a:cs typeface="Arial" panose="020B0604020202020204" pitchFamily="34" charset="0"/>
               </a:rPr>
-              <a:t>. Gene model counter program</a:t>
+              <a:t>. </a:t>
+            </a:r>
+            <a:r>
+              <a:rPr lang="en-US" sz="2400" dirty="0" smtClean="0">
+                <a:latin typeface="Arial" panose="020B0604020202020204" pitchFamily="34" charset="0"/>
+                <a:cs typeface="Arial" panose="020B0604020202020204" pitchFamily="34" charset="0"/>
+              </a:rPr>
+              <a:t>Gene model counter program</a:t>
             </a:r>
           </a:p>
           <a:p>

</xml_diff>